<commit_message>
final version of hw2
</commit_message>
<xml_diff>
--- a/Homework 2/hw2-pre.pptx
+++ b/Homework 2/hw2-pre.pptx
@@ -5,7 +5,7 @@
     <p:sldMasterId id="2147483678" r:id="rId1"/>
   </p:sldMasterIdLst>
   <p:notesMasterIdLst>
-    <p:notesMasterId r:id="rId9"/>
+    <p:notesMasterId r:id="rId10"/>
   </p:notesMasterIdLst>
   <p:sldIdLst>
     <p:sldId id="256" r:id="rId2"/>
@@ -15,6 +15,7 @@
     <p:sldId id="259" r:id="rId6"/>
     <p:sldId id="262" r:id="rId7"/>
     <p:sldId id="261" r:id="rId8"/>
+    <p:sldId id="263" r:id="rId9"/>
   </p:sldIdLst>
   <p:sldSz cx="12192000" cy="6858000"/>
   <p:notesSz cx="6858000" cy="9144000"/>
@@ -760,7 +761,27 @@
           <a:p>
             <a:r>
               <a:rPr lang="en-US" altLang="zh-CN" dirty="0"/>
-              <a:t>Here’s a peek of the information of our MongoDB database</a:t>
+              <a:t>Here’s a peek of the information of our MongoDB database. …………….. We use MongoDB Compass to interact with the database</a:t>
+            </a:r>
+            <a:r>
+              <a:rPr lang="en-CA" altLang="zh-CN" dirty="0"/>
+              <a:t>.</a:t>
+            </a:r>
+            <a:r>
+              <a:rPr lang="zh-CN" altLang="en-US" dirty="0"/>
+              <a:t> </a:t>
+            </a:r>
+            <a:r>
+              <a:rPr lang="en-CA" altLang="zh-CN" dirty="0"/>
+              <a:t>It</a:t>
+            </a:r>
+            <a:r>
+              <a:rPr lang="zh-CN" altLang="en-US" dirty="0"/>
+              <a:t> </a:t>
+            </a:r>
+            <a:r>
+              <a:rPr lang="en-CA" altLang="zh-CN" dirty="0"/>
+              <a:t>provides a graphical user interface (GUI) so that it will be easier to do the database operations.</a:t>
             </a:r>
             <a:endParaRPr lang="en-CA" dirty="0"/>
           </a:p>
@@ -8706,7 +8727,7 @@
           <a:p>
             <a:r>
               <a:rPr lang="en-CA" dirty="0"/>
-              <a:t>There are tons of movie data in IMDb. We only want to focus on comedy films. We retrieved ~500,000 comedy movies from IMDb to do further analysis.</a:t>
+              <a:t>There are tons of movie data in IMDb. We only want to focus on comedy films. We retrieved ~450,000 comedy movies from IMDb to do further analysis.</a:t>
             </a:r>
           </a:p>
         </p:txBody>
@@ -9310,6 +9331,87 @@
           </a:p>
         </p:txBody>
       </p:sp>
+      <p:sp>
+        <p:nvSpPr>
+          <p:cNvPr id="6" name="Content Placeholder 2">
+            <a:extLst>
+              <a:ext uri="{FF2B5EF4-FFF2-40B4-BE49-F238E27FC236}">
+                <a16:creationId xmlns:a16="http://schemas.microsoft.com/office/drawing/2014/main" id="{D84FFC1A-492F-4787-ADF5-070381D004F3}"/>
+              </a:ext>
+            </a:extLst>
+          </p:cNvPr>
+          <p:cNvSpPr>
+            <a:spLocks noGrp="1"/>
+          </p:cNvSpPr>
+          <p:nvPr>
+            <p:ph idx="1"/>
+          </p:nvPr>
+        </p:nvSpPr>
+        <p:spPr>
+          <a:xfrm>
+            <a:off x="6475015" y="3108960"/>
+            <a:ext cx="5335440" cy="2160709"/>
+          </a:xfrm>
+        </p:spPr>
+        <p:txBody>
+          <a:bodyPr/>
+          <a:lstStyle/>
+          <a:p>
+            <a:r>
+              <a:rPr lang="en-CA" dirty="0"/>
+              <a:t>We use MongoDB to store our data.</a:t>
+            </a:r>
+          </a:p>
+          <a:p>
+            <a:r>
+              <a:rPr lang="en-CA" dirty="0"/>
+              <a:t>The database has ~451,100 movies and the size of them is 526.1 MB.</a:t>
+            </a:r>
+          </a:p>
+          <a:p>
+            <a:r>
+              <a:rPr lang="en-CA" dirty="0"/>
+              <a:t>We use MongoDB Compass to interact with the database.</a:t>
+            </a:r>
+          </a:p>
+        </p:txBody>
+      </p:sp>
+      <p:pic>
+        <p:nvPicPr>
+          <p:cNvPr id="5" name="Picture 4" descr="Graphical user interface, text, application, email&#10;&#10;Description automatically generated">
+            <a:extLst>
+              <a:ext uri="{FF2B5EF4-FFF2-40B4-BE49-F238E27FC236}">
+                <a16:creationId xmlns:a16="http://schemas.microsoft.com/office/drawing/2014/main" id="{4079AFEC-B924-4303-8728-AA5CBD906630}"/>
+              </a:ext>
+            </a:extLst>
+          </p:cNvPr>
+          <p:cNvPicPr>
+            <a:picLocks noChangeAspect="1"/>
+          </p:cNvPicPr>
+          <p:nvPr/>
+        </p:nvPicPr>
+        <p:blipFill>
+          <a:blip r:embed="rId3">
+            <a:extLst>
+              <a:ext uri="{28A0092B-C50C-407E-A947-70E740481C1C}">
+                <a14:useLocalDpi xmlns:a14="http://schemas.microsoft.com/office/drawing/2010/main" val="0"/>
+              </a:ext>
+            </a:extLst>
+          </a:blip>
+          <a:stretch>
+            <a:fillRect/>
+          </a:stretch>
+        </p:blipFill>
+        <p:spPr>
+          <a:xfrm>
+            <a:off x="680321" y="2035147"/>
+            <a:ext cx="5192235" cy="4738661"/>
+          </a:xfrm>
+          <a:prstGeom prst="rect">
+            <a:avLst/>
+          </a:prstGeom>
+        </p:spPr>
+      </p:pic>
     </p:spTree>
     <p:extLst>
       <p:ext uri="{BB962C8B-B14F-4D97-AF65-F5344CB8AC3E}">
@@ -9362,41 +9464,285 @@
           <a:lstStyle/>
           <a:p>
             <a:r>
-              <a:rPr lang="en-CA" dirty="0"/>
+              <a:rPr lang="en-CA"/>
               <a:t>Data Visualization:</a:t>
             </a:r>
-          </a:p>
-        </p:txBody>
-      </p:sp>
-      <p:sp>
-        <p:nvSpPr>
-          <p:cNvPr id="3" name="Content Placeholder 2">
+            <a:endParaRPr lang="en-CA" dirty="0"/>
+          </a:p>
+        </p:txBody>
+      </p:sp>
+      <p:pic>
+        <p:nvPicPr>
+          <p:cNvPr id="5" name="Picture 4" descr="Chart&#10;&#10;Description automatically generated">
             <a:extLst>
               <a:ext uri="{FF2B5EF4-FFF2-40B4-BE49-F238E27FC236}">
-                <a16:creationId xmlns:a16="http://schemas.microsoft.com/office/drawing/2014/main" id="{30612C1E-9606-4B9C-8AFF-421918753626}"/>
+                <a16:creationId xmlns:a16="http://schemas.microsoft.com/office/drawing/2014/main" id="{B3AEBE2C-1472-48A0-8B14-E942AE136B14}"/>
               </a:ext>
             </a:extLst>
           </p:cNvPr>
-          <p:cNvSpPr>
-            <a:spLocks noGrp="1"/>
-          </p:cNvSpPr>
-          <p:nvPr>
-            <p:ph idx="1"/>
-          </p:nvPr>
-        </p:nvSpPr>
-        <p:spPr/>
-        <p:txBody>
-          <a:bodyPr/>
-          <a:lstStyle/>
-          <a:p>
-            <a:endParaRPr lang="en-CA" dirty="0"/>
-          </a:p>
-        </p:txBody>
-      </p:sp>
+          <p:cNvPicPr>
+            <a:picLocks noChangeAspect="1"/>
+          </p:cNvPicPr>
+          <p:nvPr/>
+        </p:nvPicPr>
+        <p:blipFill>
+          <a:blip r:embed="rId2">
+            <a:extLst>
+              <a:ext uri="{28A0092B-C50C-407E-A947-70E740481C1C}">
+                <a14:useLocalDpi xmlns:a14="http://schemas.microsoft.com/office/drawing/2010/main" val="0"/>
+              </a:ext>
+            </a:extLst>
+          </a:blip>
+          <a:stretch>
+            <a:fillRect/>
+          </a:stretch>
+        </p:blipFill>
+        <p:spPr>
+          <a:xfrm>
+            <a:off x="410984" y="2155838"/>
+            <a:ext cx="5361437" cy="3397947"/>
+          </a:xfrm>
+          <a:prstGeom prst="rect">
+            <a:avLst/>
+          </a:prstGeom>
+        </p:spPr>
+      </p:pic>
+      <p:pic>
+        <p:nvPicPr>
+          <p:cNvPr id="7" name="Picture 6" descr="Chart, scatter chart&#10;&#10;Description automatically generated">
+            <a:extLst>
+              <a:ext uri="{FF2B5EF4-FFF2-40B4-BE49-F238E27FC236}">
+                <a16:creationId xmlns:a16="http://schemas.microsoft.com/office/drawing/2014/main" id="{E6B19871-1290-44A2-A4CC-01F8880B1E4B}"/>
+              </a:ext>
+            </a:extLst>
+          </p:cNvPr>
+          <p:cNvPicPr>
+            <a:picLocks noChangeAspect="1"/>
+          </p:cNvPicPr>
+          <p:nvPr/>
+        </p:nvPicPr>
+        <p:blipFill>
+          <a:blip r:embed="rId3">
+            <a:extLst>
+              <a:ext uri="{28A0092B-C50C-407E-A947-70E740481C1C}">
+                <a14:useLocalDpi xmlns:a14="http://schemas.microsoft.com/office/drawing/2010/main" val="0"/>
+              </a:ext>
+            </a:extLst>
+          </a:blip>
+          <a:stretch>
+            <a:fillRect/>
+          </a:stretch>
+        </p:blipFill>
+        <p:spPr>
+          <a:xfrm>
+            <a:off x="6419580" y="92687"/>
+            <a:ext cx="4485905" cy="3482958"/>
+          </a:xfrm>
+          <a:prstGeom prst="rect">
+            <a:avLst/>
+          </a:prstGeom>
+        </p:spPr>
+      </p:pic>
+      <p:pic>
+        <p:nvPicPr>
+          <p:cNvPr id="14" name="Picture 13" descr="Chart, scatter chart&#10;&#10;Description automatically generated">
+            <a:extLst>
+              <a:ext uri="{FF2B5EF4-FFF2-40B4-BE49-F238E27FC236}">
+                <a16:creationId xmlns:a16="http://schemas.microsoft.com/office/drawing/2014/main" id="{E9DBA6DC-EEB4-4CC8-BD10-D70A5C6F86D4}"/>
+              </a:ext>
+            </a:extLst>
+          </p:cNvPr>
+          <p:cNvPicPr>
+            <a:picLocks noChangeAspect="1"/>
+          </p:cNvPicPr>
+          <p:nvPr/>
+        </p:nvPicPr>
+        <p:blipFill>
+          <a:blip r:embed="rId4">
+            <a:extLst>
+              <a:ext uri="{28A0092B-C50C-407E-A947-70E740481C1C}">
+                <a14:useLocalDpi xmlns:a14="http://schemas.microsoft.com/office/drawing/2010/main" val="0"/>
+              </a:ext>
+            </a:extLst>
+          </a:blip>
+          <a:stretch>
+            <a:fillRect/>
+          </a:stretch>
+        </p:blipFill>
+        <p:spPr>
+          <a:xfrm>
+            <a:off x="6096000" y="3705801"/>
+            <a:ext cx="5133067" cy="3059512"/>
+          </a:xfrm>
+          <a:prstGeom prst="rect">
+            <a:avLst/>
+          </a:prstGeom>
+        </p:spPr>
+      </p:pic>
     </p:spTree>
     <p:extLst>
       <p:ext uri="{BB962C8B-B14F-4D97-AF65-F5344CB8AC3E}">
         <p14:creationId xmlns:p14="http://schemas.microsoft.com/office/powerpoint/2010/main" val="3670758583"/>
+      </p:ext>
+    </p:extLst>
+  </p:cSld>
+  <p:clrMapOvr>
+    <a:masterClrMapping/>
+  </p:clrMapOvr>
+</p:sld>
+</file>
+
+<file path=ppt/slides/slide8.xml><?xml version="1.0" encoding="utf-8"?>
+<p:sld xmlns:a="http://schemas.openxmlformats.org/drawingml/2006/main" xmlns:r="http://schemas.openxmlformats.org/officeDocument/2006/relationships" xmlns:p="http://schemas.openxmlformats.org/presentationml/2006/main">
+  <p:cSld>
+    <p:spTree>
+      <p:nvGrpSpPr>
+        <p:cNvPr id="1" name=""/>
+        <p:cNvGrpSpPr/>
+        <p:nvPr/>
+      </p:nvGrpSpPr>
+      <p:grpSpPr>
+        <a:xfrm>
+          <a:off x="0" y="0"/>
+          <a:ext cx="0" cy="0"/>
+          <a:chOff x="0" y="0"/>
+          <a:chExt cx="0" cy="0"/>
+        </a:xfrm>
+      </p:grpSpPr>
+      <p:sp>
+        <p:nvSpPr>
+          <p:cNvPr id="2" name="Title 1">
+            <a:extLst>
+              <a:ext uri="{FF2B5EF4-FFF2-40B4-BE49-F238E27FC236}">
+                <a16:creationId xmlns:a16="http://schemas.microsoft.com/office/drawing/2014/main" id="{DEE1F931-415E-464E-A7D9-CA8B8F85F634}"/>
+              </a:ext>
+            </a:extLst>
+          </p:cNvPr>
+          <p:cNvSpPr>
+            <a:spLocks noGrp="1"/>
+          </p:cNvSpPr>
+          <p:nvPr>
+            <p:ph type="title"/>
+          </p:nvPr>
+        </p:nvSpPr>
+        <p:spPr/>
+        <p:txBody>
+          <a:bodyPr/>
+          <a:lstStyle/>
+          <a:p>
+            <a:r>
+              <a:rPr lang="en-US" altLang="zh-CN" dirty="0"/>
+              <a:t>How did we do the MAGIC plotting:</a:t>
+            </a:r>
+            <a:endParaRPr lang="en-CA" dirty="0"/>
+          </a:p>
+        </p:txBody>
+      </p:sp>
+      <p:sp>
+        <p:nvSpPr>
+          <p:cNvPr id="3" name="Content Placeholder 2">
+            <a:extLst>
+              <a:ext uri="{FF2B5EF4-FFF2-40B4-BE49-F238E27FC236}">
+                <a16:creationId xmlns:a16="http://schemas.microsoft.com/office/drawing/2014/main" id="{22603DBE-291D-430A-8634-03A36435777F}"/>
+              </a:ext>
+            </a:extLst>
+          </p:cNvPr>
+          <p:cNvSpPr>
+            <a:spLocks noGrp="1"/>
+          </p:cNvSpPr>
+          <p:nvPr>
+            <p:ph idx="1"/>
+          </p:nvPr>
+        </p:nvSpPr>
+        <p:spPr>
+          <a:xfrm>
+            <a:off x="7253826" y="2900854"/>
+            <a:ext cx="4854091" cy="2448911"/>
+          </a:xfrm>
+        </p:spPr>
+        <p:txBody>
+          <a:bodyPr/>
+          <a:lstStyle/>
+          <a:p>
+            <a:r>
+              <a:rPr lang="en-CA" dirty="0"/>
+              <a:t>With help of matplotlib and </a:t>
+            </a:r>
+            <a:r>
+              <a:rPr lang="en-CA" dirty="0" err="1"/>
+              <a:t>glueviz</a:t>
+            </a:r>
+            <a:r>
+              <a:rPr lang="en-CA" dirty="0"/>
+              <a:t> libraries/packages, we construct such informative graph showing the relationships within the database.</a:t>
+            </a:r>
+          </a:p>
+        </p:txBody>
+      </p:sp>
+      <p:pic>
+        <p:nvPicPr>
+          <p:cNvPr id="4" name="Picture 3">
+            <a:extLst>
+              <a:ext uri="{FF2B5EF4-FFF2-40B4-BE49-F238E27FC236}">
+                <a16:creationId xmlns:a16="http://schemas.microsoft.com/office/drawing/2014/main" id="{0E21B050-C1E0-4F04-BE88-F8B56C3763DD}"/>
+              </a:ext>
+            </a:extLst>
+          </p:cNvPr>
+          <p:cNvPicPr>
+            <a:picLocks noChangeAspect="1"/>
+          </p:cNvPicPr>
+          <p:nvPr/>
+        </p:nvPicPr>
+        <p:blipFill>
+          <a:blip r:embed="rId2"/>
+          <a:stretch>
+            <a:fillRect/>
+          </a:stretch>
+        </p:blipFill>
+        <p:spPr>
+          <a:xfrm>
+            <a:off x="215460" y="3429000"/>
+            <a:ext cx="1200150" cy="990600"/>
+          </a:xfrm>
+          <a:prstGeom prst="rect">
+            <a:avLst/>
+          </a:prstGeom>
+        </p:spPr>
+      </p:pic>
+      <p:pic>
+        <p:nvPicPr>
+          <p:cNvPr id="6" name="Picture 5">
+            <a:extLst>
+              <a:ext uri="{FF2B5EF4-FFF2-40B4-BE49-F238E27FC236}">
+                <a16:creationId xmlns:a16="http://schemas.microsoft.com/office/drawing/2014/main" id="{9D0601F7-39F8-48D5-BE38-192DD5FC97B6}"/>
+              </a:ext>
+            </a:extLst>
+          </p:cNvPr>
+          <p:cNvPicPr>
+            <a:picLocks noChangeAspect="1"/>
+          </p:cNvPicPr>
+          <p:nvPr/>
+        </p:nvPicPr>
+        <p:blipFill>
+          <a:blip r:embed="rId3"/>
+          <a:stretch>
+            <a:fillRect/>
+          </a:stretch>
+        </p:blipFill>
+        <p:spPr>
+          <a:xfrm>
+            <a:off x="1609711" y="2526949"/>
+            <a:ext cx="5534097" cy="3577823"/>
+          </a:xfrm>
+          <a:prstGeom prst="rect">
+            <a:avLst/>
+          </a:prstGeom>
+        </p:spPr>
+      </p:pic>
+    </p:spTree>
+    <p:extLst>
+      <p:ext uri="{BB962C8B-B14F-4D97-AF65-F5344CB8AC3E}">
+        <p14:creationId xmlns:p14="http://schemas.microsoft.com/office/powerpoint/2010/main" val="1818127384"/>
       </p:ext>
     </p:extLst>
   </p:cSld>

</xml_diff>

<commit_message>
after presentation final version
</commit_message>
<xml_diff>
--- a/Homework 2/hw2-pre.pptx
+++ b/Homework 2/hw2-pre.pptx
@@ -204,7 +204,7 @@
           <a:p>
             <a:fld id="{0FCEF1EF-909D-414B-956F-6A81FE36FE25}" type="datetimeFigureOut">
               <a:rPr lang="en-CA" smtClean="0"/>
-              <a:t>2020-11-06</a:t>
+              <a:t>2020-11-07</a:t>
             </a:fld>
             <a:endParaRPr lang="en-CA"/>
           </a:p>
@@ -648,17 +648,58 @@
           <a:lstStyle/>
           <a:p>
             <a:r>
+              <a:rPr lang="en-US" dirty="0"/>
+              <a:t>Let's take a look at the data we are interested in. </a:t>
+            </a:r>
+            <a:r>
               <a:rPr lang="en-CA" dirty="0"/>
-              <a:t>So this is the function we wrote to obtain the data of a single movie. As you can see, we have a variable named </a:t>
-            </a:r>
-            <a:r>
-              <a:rPr lang="en-CA" dirty="0" err="1"/>
-              <a:t>movie_soup</a:t>
+              <a:t>We are interested in visualizing the data of movies so that we can understand the overall trends and do</a:t>
+            </a:r>
+            <a:r>
+              <a:rPr lang="zh-CN" altLang="en-US" dirty="0"/>
+              <a:t> </a:t>
+            </a:r>
+            <a:r>
+              <a:rPr lang="en-CA" altLang="zh-CN" dirty="0"/>
+              <a:t>some</a:t>
+            </a:r>
+            <a:r>
+              <a:rPr lang="zh-CN" altLang="en-US" dirty="0"/>
+              <a:t> </a:t>
+            </a:r>
+            <a:r>
+              <a:rPr lang="en-CA" altLang="zh-CN" dirty="0"/>
+              <a:t>data </a:t>
             </a:r>
             <a:r>
               <a:rPr lang="en-CA" dirty="0"/>
-              <a:t>. We then do a series of steps to get the data we want. Then we store the data in a python dictionary.</a:t>
-            </a:r>
+              <a:t>analysis of the movie industry.</a:t>
+            </a:r>
+          </a:p>
+          <a:p>
+            <a:r>
+              <a:rPr lang="en-CA" dirty="0"/>
+              <a:t>We chose </a:t>
+            </a:r>
+            <a:r>
+              <a:rPr lang="en-CA" dirty="0">
+                <a:hlinkClick r:id="rId3"/>
+              </a:rPr>
+              <a:t>IMDb</a:t>
+            </a:r>
+            <a:r>
+              <a:rPr lang="en-CA" dirty="0"/>
+              <a:t> (Internet Movie Database) to get the movie data we want.</a:t>
+            </a:r>
+          </a:p>
+          <a:p>
+            <a:r>
+              <a:rPr lang="en-CA" dirty="0"/>
+              <a:t>There are tons of movie data in IMDb. We only want to focus on comedy films. We retrieved data of ~450,000 comedy movies from IMDb to do further analysis.</a:t>
+            </a:r>
+          </a:p>
+          <a:p>
+            <a:endParaRPr lang="en-US" dirty="0"/>
           </a:p>
         </p:txBody>
       </p:sp>
@@ -679,7 +720,7 @@
           <a:p>
             <a:fld id="{3CDB4095-D3B1-428F-B161-03F77D37B078}" type="slidenum">
               <a:rPr lang="en-CA" smtClean="0"/>
-              <a:t>3</a:t>
+              <a:t>2</a:t>
             </a:fld>
             <a:endParaRPr lang="en-CA"/>
           </a:p>
@@ -688,7 +729,7 @@
     </p:spTree>
     <p:extLst>
       <p:ext uri="{BB962C8B-B14F-4D97-AF65-F5344CB8AC3E}">
-        <p14:creationId xmlns:p14="http://schemas.microsoft.com/office/powerpoint/2010/main" val="2298275433"/>
+        <p14:creationId xmlns:p14="http://schemas.microsoft.com/office/powerpoint/2010/main" val="1377607266"/>
       </p:ext>
     </p:extLst>
   </p:cSld>
@@ -744,33 +785,16 @@
           <a:p>
             <a:r>
               <a:rPr lang="en-CA" dirty="0"/>
-              <a:t>We creates Movie class to define a single Movie object that is going to be stored in the database. The function </a:t>
+              <a:t>So this is the function we wrote to obtain the data of a single movie. As you can see, we have a variable named </a:t>
             </a:r>
             <a:r>
               <a:rPr lang="en-CA" dirty="0" err="1"/>
-              <a:t>from_dict_to_movie</a:t>
+              <a:t>movie_soup</a:t>
             </a:r>
             <a:r>
               <a:rPr lang="en-CA" dirty="0"/>
-              <a:t> converts python dictionary object to a Movie object we declared before so that we can store it into our MongoDB. Here’s the documentation of our </a:t>
-            </a:r>
-            <a:r>
-              <a:rPr lang="en-CA" dirty="0" err="1"/>
-              <a:t>movie_data</a:t>
-            </a:r>
-            <a:r>
-              <a:rPr lang="en-CA" dirty="0"/>
-              <a:t>. So each Movie object has a unique id. It has name, released or not. The year of release, the rating score, the number of ratings, and the director of the movie. </a:t>
-            </a:r>
-            <a:r>
-              <a:rPr lang="en-US" altLang="zh-CN" dirty="0"/>
-              <a:t>This is how we interact with our database and store each Movie object </a:t>
-            </a:r>
-            <a:r>
-              <a:rPr lang="en-US" altLang="zh-CN"/>
-              <a:t>to it.</a:t>
-            </a:r>
-            <a:endParaRPr lang="en-CA" dirty="0"/>
+              <a:t>. We then do a series of steps to get the data we want. Then we store the data in a python dictionary.</a:t>
+            </a:r>
           </a:p>
         </p:txBody>
       </p:sp>
@@ -791,7 +815,7 @@
           <a:p>
             <a:fld id="{3CDB4095-D3B1-428F-B161-03F77D37B078}" type="slidenum">
               <a:rPr lang="en-CA" smtClean="0"/>
-              <a:t>5</a:t>
+              <a:t>3</a:t>
             </a:fld>
             <a:endParaRPr lang="en-CA"/>
           </a:p>
@@ -800,7 +824,7 @@
     </p:spTree>
     <p:extLst>
       <p:ext uri="{BB962C8B-B14F-4D97-AF65-F5344CB8AC3E}">
-        <p14:creationId xmlns:p14="http://schemas.microsoft.com/office/powerpoint/2010/main" val="3463295143"/>
+        <p14:creationId xmlns:p14="http://schemas.microsoft.com/office/powerpoint/2010/main" val="2298275433"/>
       </p:ext>
     </p:extLst>
   </p:cSld>
@@ -855,12 +879,120 @@
           <a:lstStyle/>
           <a:p>
             <a:r>
+              <a:rPr lang="en-CA" dirty="0"/>
+              <a:t>We creates Movie class to define a single Movie object that is going to be stored in the database. The function </a:t>
+            </a:r>
+            <a:r>
+              <a:rPr lang="en-CA" dirty="0" err="1"/>
+              <a:t>from_dict_to_movie</a:t>
+            </a:r>
+            <a:r>
+              <a:rPr lang="en-CA" dirty="0"/>
+              <a:t> converts python dictionary object to a Movie object we declared before so that we can easily store it into our MongoDB. Here’s the documentation of our </a:t>
+            </a:r>
+            <a:r>
+              <a:rPr lang="en-CA" dirty="0" err="1"/>
+              <a:t>movie_data</a:t>
+            </a:r>
+            <a:r>
+              <a:rPr lang="en-CA" dirty="0"/>
+              <a:t>. So each Movie object has a unique id. It has name, released or not. The year of release, the rating score, the number of ratings, and the director of the movie. </a:t>
+            </a:r>
+            <a:r>
               <a:rPr lang="en-US" altLang="zh-CN" dirty="0"/>
-              <a:t>Here’s a peek of the information of our MongoDB database. …………….. We use MongoDB Compass to interact with the database</a:t>
+              <a:t>This is how we interact with our database and store each Movie object to it.</a:t>
+            </a:r>
+            <a:endParaRPr lang="en-CA" dirty="0"/>
+          </a:p>
+        </p:txBody>
+      </p:sp>
+      <p:sp>
+        <p:nvSpPr>
+          <p:cNvPr id="4" name="Slide Number Placeholder 3"/>
+          <p:cNvSpPr>
+            <a:spLocks noGrp="1"/>
+          </p:cNvSpPr>
+          <p:nvPr>
+            <p:ph type="sldNum" sz="quarter" idx="5"/>
+          </p:nvPr>
+        </p:nvSpPr>
+        <p:spPr/>
+        <p:txBody>
+          <a:bodyPr/>
+          <a:lstStyle/>
+          <a:p>
+            <a:fld id="{3CDB4095-D3B1-428F-B161-03F77D37B078}" type="slidenum">
+              <a:rPr lang="en-CA" smtClean="0"/>
+              <a:t>5</a:t>
+            </a:fld>
+            <a:endParaRPr lang="en-CA"/>
+          </a:p>
+        </p:txBody>
+      </p:sp>
+    </p:spTree>
+    <p:extLst>
+      <p:ext uri="{BB962C8B-B14F-4D97-AF65-F5344CB8AC3E}">
+        <p14:creationId xmlns:p14="http://schemas.microsoft.com/office/powerpoint/2010/main" val="3463295143"/>
+      </p:ext>
+    </p:extLst>
+  </p:cSld>
+  <p:clrMapOvr>
+    <a:masterClrMapping/>
+  </p:clrMapOvr>
+</p:notes>
+</file>
+
+<file path=ppt/notesSlides/notesSlide5.xml><?xml version="1.0" encoding="utf-8"?>
+<p:notes xmlns:a="http://schemas.openxmlformats.org/drawingml/2006/main" xmlns:r="http://schemas.openxmlformats.org/officeDocument/2006/relationships" xmlns:p="http://schemas.openxmlformats.org/presentationml/2006/main">
+  <p:cSld>
+    <p:spTree>
+      <p:nvGrpSpPr>
+        <p:cNvPr id="1" name=""/>
+        <p:cNvGrpSpPr/>
+        <p:nvPr/>
+      </p:nvGrpSpPr>
+      <p:grpSpPr>
+        <a:xfrm>
+          <a:off x="0" y="0"/>
+          <a:ext cx="0" cy="0"/>
+          <a:chOff x="0" y="0"/>
+          <a:chExt cx="0" cy="0"/>
+        </a:xfrm>
+      </p:grpSpPr>
+      <p:sp>
+        <p:nvSpPr>
+          <p:cNvPr id="2" name="Slide Image Placeholder 1"/>
+          <p:cNvSpPr>
+            <a:spLocks noGrp="1" noRot="1" noChangeAspect="1"/>
+          </p:cNvSpPr>
+          <p:nvPr>
+            <p:ph type="sldImg"/>
+          </p:nvPr>
+        </p:nvSpPr>
+        <p:spPr/>
+      </p:sp>
+      <p:sp>
+        <p:nvSpPr>
+          <p:cNvPr id="3" name="Notes Placeholder 2"/>
+          <p:cNvSpPr>
+            <a:spLocks noGrp="1"/>
+          </p:cNvSpPr>
+          <p:nvPr>
+            <p:ph type="body" idx="1"/>
+          </p:nvPr>
+        </p:nvSpPr>
+        <p:spPr/>
+        <p:txBody>
+          <a:bodyPr/>
+          <a:lstStyle/>
+          <a:p>
+            <a:r>
+              <a:rPr lang="en-US" altLang="zh-CN" dirty="0"/>
+              <a:t>Here’s a peek of the information of our MongoDB database. …………….. </a:t>
             </a:r>
             <a:r>
               <a:rPr lang="en-CA" altLang="zh-CN" dirty="0"/>
-              <a:t>.</a:t>
+              <a:t>It</a:t>
             </a:r>
             <a:r>
               <a:rPr lang="zh-CN" altLang="en-US" dirty="0"/>
@@ -868,15 +1000,7 @@
             </a:r>
             <a:r>
               <a:rPr lang="en-CA" altLang="zh-CN" dirty="0"/>
-              <a:t>It</a:t>
-            </a:r>
-            <a:r>
-              <a:rPr lang="zh-CN" altLang="en-US" dirty="0"/>
-              <a:t> </a:t>
-            </a:r>
-            <a:r>
-              <a:rPr lang="en-CA" altLang="zh-CN" dirty="0"/>
-              <a:t>provides a graphical user interface (GUI) so that it will be easier to do the database operations.</a:t>
+              <a:t>provides a graphical user interface (a.k.a. GUI) so that it is much more convenient for us to do the database operations.</a:t>
             </a:r>
             <a:endParaRPr lang="en-CA" dirty="0"/>
           </a:p>
@@ -918,7 +1042,7 @@
 </p:notes>
 </file>
 
-<file path=ppt/notesSlides/notesSlide5.xml><?xml version="1.0" encoding="utf-8"?>
+<file path=ppt/notesSlides/notesSlide6.xml><?xml version="1.0" encoding="utf-8"?>
 <p:notes xmlns:a="http://schemas.openxmlformats.org/drawingml/2006/main" xmlns:r="http://schemas.openxmlformats.org/officeDocument/2006/relationships" xmlns:p="http://schemas.openxmlformats.org/presentationml/2006/main">
   <p:cSld>
     <p:spTree>
@@ -1279,7 +1403,7 @@
           <a:p>
             <a:fld id="{3372BB4F-0E8D-4BE5-A3CF-D81A39B506F9}" type="datetimeFigureOut">
               <a:rPr lang="en-CA" smtClean="0"/>
-              <a:t>2020-11-06</a:t>
+              <a:t>2020-11-07</a:t>
             </a:fld>
             <a:endParaRPr lang="en-CA"/>
           </a:p>
@@ -1693,7 +1817,7 @@
           <a:p>
             <a:fld id="{3372BB4F-0E8D-4BE5-A3CF-D81A39B506F9}" type="datetimeFigureOut">
               <a:rPr lang="en-CA" smtClean="0"/>
-              <a:t>2020-11-06</a:t>
+              <a:t>2020-11-07</a:t>
             </a:fld>
             <a:endParaRPr lang="en-CA"/>
           </a:p>
@@ -2029,7 +2153,7 @@
           <a:p>
             <a:fld id="{3372BB4F-0E8D-4BE5-A3CF-D81A39B506F9}" type="datetimeFigureOut">
               <a:rPr lang="en-CA" smtClean="0"/>
-              <a:t>2020-11-06</a:t>
+              <a:t>2020-11-07</a:t>
             </a:fld>
             <a:endParaRPr lang="en-CA"/>
           </a:p>
@@ -2434,7 +2558,7 @@
           <a:p>
             <a:fld id="{3372BB4F-0E8D-4BE5-A3CF-D81A39B506F9}" type="datetimeFigureOut">
               <a:rPr lang="en-CA" smtClean="0"/>
-              <a:t>2020-11-06</a:t>
+              <a:t>2020-11-07</a:t>
             </a:fld>
             <a:endParaRPr lang="en-CA"/>
           </a:p>
@@ -3002,7 +3126,7 @@
           <a:p>
             <a:fld id="{3372BB4F-0E8D-4BE5-A3CF-D81A39B506F9}" type="datetimeFigureOut">
               <a:rPr lang="en-CA" smtClean="0"/>
-              <a:t>2020-11-06</a:t>
+              <a:t>2020-11-07</a:t>
             </a:fld>
             <a:endParaRPr lang="en-CA"/>
           </a:p>
@@ -3683,7 +3807,7 @@
           <a:p>
             <a:fld id="{3372BB4F-0E8D-4BE5-A3CF-D81A39B506F9}" type="datetimeFigureOut">
               <a:rPr lang="en-CA" smtClean="0"/>
-              <a:t>2020-11-06</a:t>
+              <a:t>2020-11-07</a:t>
             </a:fld>
             <a:endParaRPr lang="en-CA"/>
           </a:p>
@@ -4596,7 +4720,7 @@
           <a:p>
             <a:fld id="{3372BB4F-0E8D-4BE5-A3CF-D81A39B506F9}" type="datetimeFigureOut">
               <a:rPr lang="en-CA" smtClean="0"/>
-              <a:t>2020-11-06</a:t>
+              <a:t>2020-11-07</a:t>
             </a:fld>
             <a:endParaRPr lang="en-CA"/>
           </a:p>
@@ -4909,7 +5033,7 @@
           <a:p>
             <a:fld id="{3372BB4F-0E8D-4BE5-A3CF-D81A39B506F9}" type="datetimeFigureOut">
               <a:rPr lang="en-CA" smtClean="0"/>
-              <a:t>2020-11-06</a:t>
+              <a:t>2020-11-07</a:t>
             </a:fld>
             <a:endParaRPr lang="en-CA"/>
           </a:p>
@@ -5173,7 +5297,7 @@
           <a:p>
             <a:fld id="{3372BB4F-0E8D-4BE5-A3CF-D81A39B506F9}" type="datetimeFigureOut">
               <a:rPr lang="en-CA" smtClean="0"/>
-              <a:t>2020-11-06</a:t>
+              <a:t>2020-11-07</a:t>
             </a:fld>
             <a:endParaRPr lang="en-CA"/>
           </a:p>
@@ -5496,7 +5620,7 @@
           <a:p>
             <a:fld id="{3372BB4F-0E8D-4BE5-A3CF-D81A39B506F9}" type="datetimeFigureOut">
               <a:rPr lang="en-CA" smtClean="0"/>
-              <a:t>2020-11-06</a:t>
+              <a:t>2020-11-07</a:t>
             </a:fld>
             <a:endParaRPr lang="en-CA"/>
           </a:p>
@@ -5885,7 +6009,7 @@
           <a:p>
             <a:fld id="{3372BB4F-0E8D-4BE5-A3CF-D81A39B506F9}" type="datetimeFigureOut">
               <a:rPr lang="en-CA" smtClean="0"/>
-              <a:t>2020-11-06</a:t>
+              <a:t>2020-11-07</a:t>
             </a:fld>
             <a:endParaRPr lang="en-CA"/>
           </a:p>
@@ -6261,7 +6385,7 @@
           <a:p>
             <a:fld id="{3372BB4F-0E8D-4BE5-A3CF-D81A39B506F9}" type="datetimeFigureOut">
               <a:rPr lang="en-CA" smtClean="0"/>
-              <a:t>2020-11-06</a:t>
+              <a:t>2020-11-07</a:t>
             </a:fld>
             <a:endParaRPr lang="en-CA"/>
           </a:p>
@@ -6767,7 +6891,7 @@
           <a:p>
             <a:fld id="{3372BB4F-0E8D-4BE5-A3CF-D81A39B506F9}" type="datetimeFigureOut">
               <a:rPr lang="en-CA" smtClean="0"/>
-              <a:t>2020-11-06</a:t>
+              <a:t>2020-11-07</a:t>
             </a:fld>
             <a:endParaRPr lang="en-CA"/>
           </a:p>
@@ -7024,7 +7148,7 @@
           <a:p>
             <a:fld id="{3372BB4F-0E8D-4BE5-A3CF-D81A39B506F9}" type="datetimeFigureOut">
               <a:rPr lang="en-CA" smtClean="0"/>
-              <a:t>2020-11-06</a:t>
+              <a:t>2020-11-07</a:t>
             </a:fld>
             <a:endParaRPr lang="en-CA"/>
           </a:p>
@@ -7187,7 +7311,7 @@
           <a:p>
             <a:fld id="{3372BB4F-0E8D-4BE5-A3CF-D81A39B506F9}" type="datetimeFigureOut">
               <a:rPr lang="en-CA" smtClean="0"/>
-              <a:t>2020-11-06</a:t>
+              <a:t>2020-11-07</a:t>
             </a:fld>
             <a:endParaRPr lang="en-CA"/>
           </a:p>
@@ -7577,7 +7701,7 @@
           <a:p>
             <a:fld id="{3372BB4F-0E8D-4BE5-A3CF-D81A39B506F9}" type="datetimeFigureOut">
               <a:rPr lang="en-CA" smtClean="0"/>
-              <a:t>2020-11-06</a:t>
+              <a:t>2020-11-07</a:t>
             </a:fld>
             <a:endParaRPr lang="en-CA"/>
           </a:p>
@@ -7986,7 +8110,7 @@
           <a:p>
             <a:fld id="{3372BB4F-0E8D-4BE5-A3CF-D81A39B506F9}" type="datetimeFigureOut">
               <a:rPr lang="en-CA" smtClean="0"/>
-              <a:t>2020-11-06</a:t>
+              <a:t>2020-11-07</a:t>
             </a:fld>
             <a:endParaRPr lang="en-CA"/>
           </a:p>
@@ -8230,7 +8354,7 @@
           <a:p>
             <a:fld id="{3372BB4F-0E8D-4BE5-A3CF-D81A39B506F9}" type="datetimeFigureOut">
               <a:rPr lang="en-CA" smtClean="0"/>
-              <a:t>2020-11-06</a:t>
+              <a:t>2020-11-07</a:t>
             </a:fld>
             <a:endParaRPr lang="en-CA"/>
           </a:p>
@@ -8922,7 +9046,7 @@
             </a:r>
             <a:r>
               <a:rPr lang="en-CA" dirty="0">
-                <a:hlinkClick r:id="rId2"/>
+                <a:hlinkClick r:id="rId3"/>
               </a:rPr>
               <a:t>IMDb</a:t>
             </a:r>
@@ -8954,7 +9078,7 @@
           <p:nvPr/>
         </p:nvPicPr>
         <p:blipFill rotWithShape="1">
-          <a:blip r:embed="rId3">
+          <a:blip r:embed="rId4">
             <a:extLst>
               <a:ext uri="{28A0092B-C50C-407E-A947-70E740481C1C}">
                 <a14:useLocalDpi xmlns:a14="http://schemas.microsoft.com/office/drawing/2010/main" val="0"/>
@@ -9564,11 +9688,13 @@
         <p:spPr>
           <a:xfrm>
             <a:off x="6475015" y="3108960"/>
-            <a:ext cx="5335440" cy="2160709"/>
-          </a:xfrm>
-        </p:spPr>
-        <p:txBody>
-          <a:bodyPr/>
+            <a:ext cx="5335440" cy="2443541"/>
+          </a:xfrm>
+        </p:spPr>
+        <p:txBody>
+          <a:bodyPr>
+            <a:normAutofit/>
+          </a:bodyPr>
           <a:lstStyle/>
           <a:p>
             <a:r>
@@ -9579,7 +9705,7 @@
           <a:p>
             <a:r>
               <a:rPr lang="en-CA" dirty="0"/>
-              <a:t>The database has ~451,100 movies and the size of them is 526.1 MB.</a:t>
+              <a:t>The database has ~451,000 movies and the size of them is 526.1 MB in total.</a:t>
             </a:r>
           </a:p>
           <a:p>
@@ -9846,7 +9972,7 @@
           <a:p>
             <a:r>
               <a:rPr lang="en-US" altLang="zh-CN" dirty="0"/>
-              <a:t>How did we create such </a:t>
+              <a:t>How we created such </a:t>
             </a:r>
             <a:r>
               <a:rPr lang="en-US" altLang="zh-CN" i="1" dirty="0"/>
@@ -9878,8 +10004,8 @@
         </p:nvSpPr>
         <p:spPr>
           <a:xfrm>
-            <a:off x="7253826" y="2900854"/>
-            <a:ext cx="4854091" cy="2448911"/>
+            <a:off x="7143808" y="3050629"/>
+            <a:ext cx="4946954" cy="2530462"/>
           </a:xfrm>
         </p:spPr>
         <p:txBody>
@@ -9896,7 +10022,7 @@
             </a:r>
             <a:r>
               <a:rPr lang="en-CA" dirty="0"/>
-              <a:t> libraries/packages, we construct such informative graph showing the relationships within the database.</a:t>
+              <a:t> libraries/packages, we construct such informative graph showing the relationships between the data in the database.</a:t>
             </a:r>
           </a:p>
         </p:txBody>

</xml_diff>